<commit_message>
started draft of final report
</commit_message>
<xml_diff>
--- a/deliverables/Figures.pptx
+++ b/deliverables/Figures.pptx
@@ -5,9 +5,10 @@
     <p:sldMasterId id="2147483648" r:id="rId1"/>
   </p:sldMasterIdLst>
   <p:sldIdLst>
-    <p:sldId id="256" r:id="rId2"/>
-    <p:sldId id="257" r:id="rId3"/>
-    <p:sldId id="258" r:id="rId4"/>
+    <p:sldId id="259" r:id="rId2"/>
+    <p:sldId id="256" r:id="rId3"/>
+    <p:sldId id="257" r:id="rId4"/>
+    <p:sldId id="260" r:id="rId5"/>
   </p:sldIdLst>
   <p:sldSz cx="9144000" cy="6858000" type="screen4x3"/>
   <p:notesSz cx="6858000" cy="9144000"/>
@@ -290,7 +291,7 @@
           <a:p>
             <a:fld id="{FC1D4FC9-9FF8-C142-B894-6554F770A56E}" type="datetimeFigureOut">
               <a:rPr lang="en-US" smtClean="0"/>
-              <a:t>2/22/16</a:t>
+              <a:t>3/12/16</a:t>
             </a:fld>
             <a:endParaRPr lang="en-US"/>
           </a:p>
@@ -460,7 +461,7 @@
           <a:p>
             <a:fld id="{FC1D4FC9-9FF8-C142-B894-6554F770A56E}" type="datetimeFigureOut">
               <a:rPr lang="en-US" smtClean="0"/>
-              <a:t>2/22/16</a:t>
+              <a:t>3/12/16</a:t>
             </a:fld>
             <a:endParaRPr lang="en-US"/>
           </a:p>
@@ -640,7 +641,7 @@
           <a:p>
             <a:fld id="{FC1D4FC9-9FF8-C142-B894-6554F770A56E}" type="datetimeFigureOut">
               <a:rPr lang="en-US" smtClean="0"/>
-              <a:t>2/22/16</a:t>
+              <a:t>3/12/16</a:t>
             </a:fld>
             <a:endParaRPr lang="en-US"/>
           </a:p>
@@ -810,7 +811,7 @@
           <a:p>
             <a:fld id="{FC1D4FC9-9FF8-C142-B894-6554F770A56E}" type="datetimeFigureOut">
               <a:rPr lang="en-US" smtClean="0"/>
-              <a:t>2/22/16</a:t>
+              <a:t>3/12/16</a:t>
             </a:fld>
             <a:endParaRPr lang="en-US"/>
           </a:p>
@@ -1056,7 +1057,7 @@
           <a:p>
             <a:fld id="{FC1D4FC9-9FF8-C142-B894-6554F770A56E}" type="datetimeFigureOut">
               <a:rPr lang="en-US" smtClean="0"/>
-              <a:t>2/22/16</a:t>
+              <a:t>3/12/16</a:t>
             </a:fld>
             <a:endParaRPr lang="en-US"/>
           </a:p>
@@ -1344,7 +1345,7 @@
           <a:p>
             <a:fld id="{FC1D4FC9-9FF8-C142-B894-6554F770A56E}" type="datetimeFigureOut">
               <a:rPr lang="en-US" smtClean="0"/>
-              <a:t>2/22/16</a:t>
+              <a:t>3/12/16</a:t>
             </a:fld>
             <a:endParaRPr lang="en-US"/>
           </a:p>
@@ -1766,7 +1767,7 @@
           <a:p>
             <a:fld id="{FC1D4FC9-9FF8-C142-B894-6554F770A56E}" type="datetimeFigureOut">
               <a:rPr lang="en-US" smtClean="0"/>
-              <a:t>2/22/16</a:t>
+              <a:t>3/12/16</a:t>
             </a:fld>
             <a:endParaRPr lang="en-US"/>
           </a:p>
@@ -1884,7 +1885,7 @@
           <a:p>
             <a:fld id="{FC1D4FC9-9FF8-C142-B894-6554F770A56E}" type="datetimeFigureOut">
               <a:rPr lang="en-US" smtClean="0"/>
-              <a:t>2/22/16</a:t>
+              <a:t>3/12/16</a:t>
             </a:fld>
             <a:endParaRPr lang="en-US"/>
           </a:p>
@@ -1979,7 +1980,7 @@
           <a:p>
             <a:fld id="{FC1D4FC9-9FF8-C142-B894-6554F770A56E}" type="datetimeFigureOut">
               <a:rPr lang="en-US" smtClean="0"/>
-              <a:t>2/22/16</a:t>
+              <a:t>3/12/16</a:t>
             </a:fld>
             <a:endParaRPr lang="en-US"/>
           </a:p>
@@ -2256,7 +2257,7 @@
           <a:p>
             <a:fld id="{FC1D4FC9-9FF8-C142-B894-6554F770A56E}" type="datetimeFigureOut">
               <a:rPr lang="en-US" smtClean="0"/>
-              <a:t>2/22/16</a:t>
+              <a:t>3/12/16</a:t>
             </a:fld>
             <a:endParaRPr lang="en-US"/>
           </a:p>
@@ -2509,7 +2510,7 @@
           <a:p>
             <a:fld id="{FC1D4FC9-9FF8-C142-B894-6554F770A56E}" type="datetimeFigureOut">
               <a:rPr lang="en-US" smtClean="0"/>
-              <a:t>2/22/16</a:t>
+              <a:t>3/12/16</a:t>
             </a:fld>
             <a:endParaRPr lang="en-US"/>
           </a:p>
@@ -2722,7 +2723,7 @@
           <a:p>
             <a:fld id="{FC1D4FC9-9FF8-C142-B894-6554F770A56E}" type="datetimeFigureOut">
               <a:rPr lang="en-US" smtClean="0"/>
-              <a:t>2/22/16</a:t>
+              <a:t>3/12/16</a:t>
             </a:fld>
             <a:endParaRPr lang="en-US"/>
           </a:p>
@@ -3105,8 +3106,8 @@
         </p:nvSpPr>
         <p:spPr>
           <a:xfrm>
-            <a:off x="1270041" y="2314651"/>
-            <a:ext cx="1281911" cy="1281911"/>
+            <a:off x="1018158" y="2767874"/>
+            <a:ext cx="914400" cy="914400"/>
           </a:xfrm>
           <a:prstGeom prst="ellipse">
             <a:avLst/>
@@ -3132,22 +3133,27 @@
           <a:p>
             <a:pPr algn="ctr"/>
             <a:r>
-              <a:rPr lang="en-US" dirty="0"/>
-              <a:t>A</a:t>
-            </a:r>
-          </a:p>
-        </p:txBody>
-      </p:sp>
-      <p:sp>
-        <p:nvSpPr>
-          <p:cNvPr id="5" name="Oval 4"/>
+              <a:rPr lang="en-US" i="1" dirty="0" smtClean="0"/>
+              <a:t>S</a:t>
+            </a:r>
+            <a:r>
+              <a:rPr lang="en-US" i="1" baseline="-25000" dirty="0" smtClean="0"/>
+              <a:t>0</a:t>
+            </a:r>
+            <a:endParaRPr lang="en-US" i="1" dirty="0"/>
+          </a:p>
+        </p:txBody>
+      </p:sp>
+      <p:sp>
+        <p:nvSpPr>
+          <p:cNvPr id="6" name="Oval 5"/>
           <p:cNvSpPr/>
           <p:nvPr/>
         </p:nvSpPr>
         <p:spPr>
           <a:xfrm>
-            <a:off x="3713263" y="2314651"/>
-            <a:ext cx="1281911" cy="1281911"/>
+            <a:off x="2470983" y="1361047"/>
+            <a:ext cx="914400" cy="914400"/>
           </a:xfrm>
           <a:prstGeom prst="ellipse">
             <a:avLst/>
@@ -3173,23 +3179,31 @@
           <a:p>
             <a:pPr algn="ctr"/>
             <a:r>
-              <a:rPr lang="en-US" dirty="0" smtClean="0"/>
-              <a:t>B</a:t>
-            </a:r>
-            <a:endParaRPr lang="en-US" dirty="0"/>
-          </a:p>
-        </p:txBody>
-      </p:sp>
-      <p:sp>
-        <p:nvSpPr>
-          <p:cNvPr id="6" name="Oval 5"/>
+              <a:rPr lang="en-US" sz="1700" i="1" dirty="0" smtClean="0"/>
+              <a:t>S</a:t>
+            </a:r>
+            <a:r>
+              <a:rPr lang="en-US" sz="1700" i="1" baseline="-25000" dirty="0" smtClean="0"/>
+              <a:t>1</a:t>
+            </a:r>
+            <a:r>
+              <a:rPr lang="en-US" sz="1700" i="1" baseline="30000" dirty="0" smtClean="0"/>
+              <a:t>(1)</a:t>
+            </a:r>
+            <a:endParaRPr lang="en-US" sz="1700" i="1" dirty="0"/>
+          </a:p>
+        </p:txBody>
+      </p:sp>
+      <p:sp>
+        <p:nvSpPr>
+          <p:cNvPr id="7" name="Oval 6"/>
           <p:cNvSpPr/>
           <p:nvPr/>
         </p:nvSpPr>
         <p:spPr>
           <a:xfrm>
-            <a:off x="5610208" y="571991"/>
-            <a:ext cx="1281911" cy="1281911"/>
+            <a:off x="7236972" y="2767874"/>
+            <a:ext cx="914400" cy="914400"/>
           </a:xfrm>
           <a:prstGeom prst="ellipse">
             <a:avLst/>
@@ -3215,8 +3229,86 @@
           <a:p>
             <a:pPr algn="ctr"/>
             <a:r>
+              <a:rPr lang="en-US" i="1" dirty="0" smtClean="0"/>
+              <a:t>S</a:t>
+            </a:r>
+            <a:r>
+              <a:rPr lang="en-US" i="1" baseline="-25000" dirty="0" smtClean="0"/>
+              <a:t>i</a:t>
+            </a:r>
+            <a:endParaRPr lang="en-US" i="1" dirty="0"/>
+          </a:p>
+        </p:txBody>
+      </p:sp>
+      <p:cxnSp>
+        <p:nvCxnSpPr>
+          <p:cNvPr id="9" name="Straight Arrow Connector 8"/>
+          <p:cNvCxnSpPr>
+            <a:stCxn id="4" idx="7"/>
+            <a:endCxn id="6" idx="3"/>
+          </p:cNvCxnSpPr>
+          <p:nvPr/>
+        </p:nvCxnSpPr>
+        <p:spPr>
+          <a:xfrm flipV="1">
+            <a:off x="1798647" y="2141536"/>
+            <a:ext cx="806247" cy="760249"/>
+          </a:xfrm>
+          <a:prstGeom prst="straightConnector1">
+            <a:avLst/>
+          </a:prstGeom>
+          <a:ln>
+            <a:tailEnd type="arrow"/>
+          </a:ln>
+        </p:spPr>
+        <p:style>
+          <a:lnRef idx="2">
+            <a:schemeClr val="accent1"/>
+          </a:lnRef>
+          <a:fillRef idx="0">
+            <a:schemeClr val="accent1"/>
+          </a:fillRef>
+          <a:effectRef idx="1">
+            <a:schemeClr val="accent1"/>
+          </a:effectRef>
+          <a:fontRef idx="minor">
+            <a:schemeClr val="tx1"/>
+          </a:fontRef>
+        </p:style>
+      </p:cxnSp>
+      <p:sp>
+        <p:nvSpPr>
+          <p:cNvPr id="18" name="TextBox 17"/>
+          <p:cNvSpPr txBox="1"/>
+          <p:nvPr/>
+        </p:nvSpPr>
+        <p:spPr>
+          <a:xfrm>
+            <a:off x="1713964" y="2162528"/>
+            <a:ext cx="608852" cy="369332"/>
+          </a:xfrm>
+          <a:prstGeom prst="rect">
+            <a:avLst/>
+          </a:prstGeom>
+          <a:noFill/>
+        </p:spPr>
+        <p:txBody>
+          <a:bodyPr wrap="square" rtlCol="0">
+            <a:spAutoFit/>
+          </a:bodyPr>
+          <a:lstStyle/>
+          <a:p>
+            <a:r>
               <a:rPr lang="en-US" dirty="0" smtClean="0"/>
-              <a:t>C</a:t>
+              <a:t>λ</a:t>
+            </a:r>
+            <a:r>
+              <a:rPr lang="en-US" baseline="-25000" dirty="0" smtClean="0"/>
+              <a:t>1</a:t>
+            </a:r>
+            <a:r>
+              <a:rPr lang="en-US" baseline="30000" dirty="0" smtClean="0"/>
+              <a:t>(1)</a:t>
             </a:r>
             <a:endParaRPr lang="en-US" dirty="0"/>
           </a:p>
@@ -3224,14 +3316,45 @@
       </p:sp>
       <p:sp>
         <p:nvSpPr>
-          <p:cNvPr id="7" name="Oval 6"/>
+          <p:cNvPr id="19" name="TextBox 18"/>
+          <p:cNvSpPr txBox="1"/>
+          <p:nvPr/>
+        </p:nvSpPr>
+        <p:spPr>
+          <a:xfrm>
+            <a:off x="4437129" y="1551959"/>
+            <a:ext cx="439173" cy="369332"/>
+          </a:xfrm>
+          <a:prstGeom prst="rect">
+            <a:avLst/>
+          </a:prstGeom>
+          <a:noFill/>
+        </p:spPr>
+        <p:txBody>
+          <a:bodyPr wrap="square" rtlCol="0">
+            <a:spAutoFit/>
+          </a:bodyPr>
+          <a:lstStyle/>
+          <a:p>
+            <a:pPr algn="ctr"/>
+            <a:r>
+              <a:rPr lang="en-US" dirty="0" smtClean="0"/>
+              <a:t>…</a:t>
+            </a:r>
+            <a:endParaRPr lang="en-US" dirty="0"/>
+          </a:p>
+        </p:txBody>
+      </p:sp>
+      <p:sp>
+        <p:nvSpPr>
+          <p:cNvPr id="17" name="Oval 16"/>
           <p:cNvSpPr/>
           <p:nvPr/>
         </p:nvSpPr>
         <p:spPr>
           <a:xfrm>
-            <a:off x="5610208" y="4116907"/>
-            <a:ext cx="1281911" cy="1281911"/>
+            <a:off x="5929790" y="1361047"/>
+            <a:ext cx="914400" cy="914400"/>
           </a:xfrm>
           <a:prstGeom prst="ellipse">
             <a:avLst/>
@@ -3257,26 +3380,37 @@
           <a:p>
             <a:pPr algn="ctr"/>
             <a:r>
-              <a:rPr lang="en-US" dirty="0" smtClean="0"/>
-              <a:t>D</a:t>
-            </a:r>
-            <a:endParaRPr lang="en-US" dirty="0"/>
+              <a:rPr lang="en-US" sz="1700" i="1" dirty="0" smtClean="0"/>
+              <a:t>S</a:t>
+            </a:r>
+            <a:r>
+              <a:rPr lang="en-US" sz="1700" i="1" baseline="-25000" dirty="0" smtClean="0"/>
+              <a:t>L-1</a:t>
+            </a:r>
+            <a:r>
+              <a:rPr lang="en-US" sz="1700" i="1" baseline="30000" dirty="0" smtClean="0"/>
+              <a:t>(</a:t>
+            </a:r>
+            <a:r>
+              <a:rPr lang="en-US" sz="1700" i="1" baseline="30000" dirty="0"/>
+              <a:t>1)</a:t>
+            </a:r>
+            <a:endParaRPr lang="en-US" sz="1700" i="1" dirty="0"/>
           </a:p>
         </p:txBody>
       </p:sp>
       <p:cxnSp>
         <p:nvCxnSpPr>
-          <p:cNvPr id="9" name="Straight Arrow Connector 8"/>
+          <p:cNvPr id="21" name="Straight Arrow Connector 20"/>
           <p:cNvCxnSpPr>
-            <a:stCxn id="4" idx="6"/>
-            <a:endCxn id="5" idx="2"/>
+            <a:stCxn id="6" idx="6"/>
           </p:cNvCxnSpPr>
           <p:nvPr/>
         </p:nvCxnSpPr>
         <p:spPr>
           <a:xfrm>
-            <a:off x="2551952" y="2955607"/>
-            <a:ext cx="1161311" cy="0"/>
+            <a:off x="3385383" y="1818247"/>
+            <a:ext cx="770742" cy="0"/>
           </a:xfrm>
           <a:prstGeom prst="straightConnector1">
             <a:avLst/>
@@ -3302,17 +3436,14 @@
       </p:cxnSp>
       <p:cxnSp>
         <p:nvCxnSpPr>
-          <p:cNvPr id="12" name="Straight Arrow Connector 11"/>
-          <p:cNvCxnSpPr>
-            <a:stCxn id="5" idx="7"/>
-            <a:endCxn id="6" idx="3"/>
-          </p:cNvCxnSpPr>
+          <p:cNvPr id="22" name="Straight Arrow Connector 21"/>
+          <p:cNvCxnSpPr/>
           <p:nvPr/>
         </p:nvCxnSpPr>
         <p:spPr>
-          <a:xfrm flipV="1">
-            <a:off x="4807442" y="1666170"/>
-            <a:ext cx="990498" cy="836213"/>
+          <a:xfrm>
+            <a:off x="5159048" y="1818247"/>
+            <a:ext cx="770742" cy="0"/>
           </a:xfrm>
           <a:prstGeom prst="straightConnector1">
             <a:avLst/>
@@ -3338,17 +3469,17 @@
       </p:cxnSp>
       <p:cxnSp>
         <p:nvCxnSpPr>
-          <p:cNvPr id="14" name="Straight Arrow Connector 13"/>
+          <p:cNvPr id="23" name="Straight Arrow Connector 22"/>
           <p:cNvCxnSpPr>
-            <a:stCxn id="5" idx="5"/>
+            <a:stCxn id="17" idx="5"/>
             <a:endCxn id="7" idx="1"/>
           </p:cNvCxnSpPr>
           <p:nvPr/>
         </p:nvCxnSpPr>
         <p:spPr>
           <a:xfrm>
-            <a:off x="4807442" y="3408830"/>
-            <a:ext cx="990498" cy="895809"/>
+            <a:off x="6710279" y="2141536"/>
+            <a:ext cx="660604" cy="760249"/>
           </a:xfrm>
           <a:prstGeom prst="straightConnector1">
             <a:avLst/>
@@ -3374,13 +3505,253 @@
       </p:cxnSp>
       <p:sp>
         <p:nvSpPr>
-          <p:cNvPr id="18" name="TextBox 17"/>
+          <p:cNvPr id="27" name="Oval 26"/>
+          <p:cNvSpPr/>
+          <p:nvPr/>
+        </p:nvSpPr>
+        <p:spPr>
+          <a:xfrm>
+            <a:off x="2459251" y="4297791"/>
+            <a:ext cx="914400" cy="914400"/>
+          </a:xfrm>
+          <a:prstGeom prst="ellipse">
+            <a:avLst/>
+          </a:prstGeom>
+        </p:spPr>
+        <p:style>
+          <a:lnRef idx="1">
+            <a:schemeClr val="accent1"/>
+          </a:lnRef>
+          <a:fillRef idx="3">
+            <a:schemeClr val="accent1"/>
+          </a:fillRef>
+          <a:effectRef idx="2">
+            <a:schemeClr val="accent1"/>
+          </a:effectRef>
+          <a:fontRef idx="minor">
+            <a:schemeClr val="lt1"/>
+          </a:fontRef>
+        </p:style>
+        <p:txBody>
+          <a:bodyPr rtlCol="0" anchor="ctr"/>
+          <a:lstStyle/>
+          <a:p>
+            <a:pPr algn="ctr"/>
+            <a:r>
+              <a:rPr lang="en-US" sz="1700" i="1" dirty="0"/>
+              <a:t>S</a:t>
+            </a:r>
+            <a:r>
+              <a:rPr lang="en-US" sz="1700" i="1" baseline="-25000" dirty="0"/>
+              <a:t>1</a:t>
+            </a:r>
+            <a:r>
+              <a:rPr lang="en-US" sz="1700" i="1" baseline="30000" dirty="0" smtClean="0"/>
+              <a:t>(2)</a:t>
+            </a:r>
+            <a:endParaRPr lang="en-US" sz="1700" i="1" dirty="0"/>
+          </a:p>
+        </p:txBody>
+      </p:sp>
+      <p:cxnSp>
+        <p:nvCxnSpPr>
+          <p:cNvPr id="28" name="Straight Arrow Connector 27"/>
+          <p:cNvCxnSpPr>
+            <a:stCxn id="30" idx="7"/>
+            <a:endCxn id="7" idx="3"/>
+          </p:cNvCxnSpPr>
+          <p:nvPr/>
+        </p:nvCxnSpPr>
+        <p:spPr>
+          <a:xfrm flipV="1">
+            <a:off x="6710279" y="3548363"/>
+            <a:ext cx="660604" cy="883339"/>
+          </a:xfrm>
+          <a:prstGeom prst="straightConnector1">
+            <a:avLst/>
+          </a:prstGeom>
+          <a:ln>
+            <a:tailEnd type="arrow"/>
+          </a:ln>
+        </p:spPr>
+        <p:style>
+          <a:lnRef idx="2">
+            <a:schemeClr val="accent1"/>
+          </a:lnRef>
+          <a:fillRef idx="0">
+            <a:schemeClr val="accent1"/>
+          </a:fillRef>
+          <a:effectRef idx="1">
+            <a:schemeClr val="accent1"/>
+          </a:effectRef>
+          <a:fontRef idx="minor">
+            <a:schemeClr val="tx1"/>
+          </a:fontRef>
+        </p:style>
+      </p:cxnSp>
+      <p:sp>
+        <p:nvSpPr>
+          <p:cNvPr id="30" name="Oval 29"/>
+          <p:cNvSpPr/>
+          <p:nvPr/>
+        </p:nvSpPr>
+        <p:spPr>
+          <a:xfrm>
+            <a:off x="5929790" y="4297791"/>
+            <a:ext cx="914400" cy="914400"/>
+          </a:xfrm>
+          <a:prstGeom prst="ellipse">
+            <a:avLst/>
+          </a:prstGeom>
+        </p:spPr>
+        <p:style>
+          <a:lnRef idx="1">
+            <a:schemeClr val="accent1"/>
+          </a:lnRef>
+          <a:fillRef idx="3">
+            <a:schemeClr val="accent1"/>
+          </a:fillRef>
+          <a:effectRef idx="2">
+            <a:schemeClr val="accent1"/>
+          </a:effectRef>
+          <a:fontRef idx="minor">
+            <a:schemeClr val="lt1"/>
+          </a:fontRef>
+        </p:style>
+        <p:txBody>
+          <a:bodyPr rtlCol="0" anchor="ctr"/>
+          <a:lstStyle/>
+          <a:p>
+            <a:pPr algn="ctr"/>
+            <a:r>
+              <a:rPr lang="en-US" sz="1700" i="1" dirty="0" smtClean="0"/>
+              <a:t>S</a:t>
+            </a:r>
+            <a:r>
+              <a:rPr lang="en-US" sz="1700" i="1" baseline="-25000" dirty="0" smtClean="0"/>
+              <a:t>K-1</a:t>
+            </a:r>
+            <a:r>
+              <a:rPr lang="en-US" sz="1700" i="1" baseline="30000" dirty="0" smtClean="0"/>
+              <a:t>(2)</a:t>
+            </a:r>
+            <a:endParaRPr lang="en-US" sz="1700" i="1" dirty="0"/>
+          </a:p>
+        </p:txBody>
+      </p:sp>
+      <p:cxnSp>
+        <p:nvCxnSpPr>
+          <p:cNvPr id="31" name="Straight Arrow Connector 30"/>
+          <p:cNvCxnSpPr>
+            <a:stCxn id="27" idx="6"/>
+          </p:cNvCxnSpPr>
+          <p:nvPr/>
+        </p:nvCxnSpPr>
+        <p:spPr>
+          <a:xfrm>
+            <a:off x="3373651" y="4754991"/>
+            <a:ext cx="770742" cy="0"/>
+          </a:xfrm>
+          <a:prstGeom prst="straightConnector1">
+            <a:avLst/>
+          </a:prstGeom>
+          <a:ln>
+            <a:tailEnd type="arrow"/>
+          </a:ln>
+        </p:spPr>
+        <p:style>
+          <a:lnRef idx="2">
+            <a:schemeClr val="accent1"/>
+          </a:lnRef>
+          <a:fillRef idx="0">
+            <a:schemeClr val="accent1"/>
+          </a:fillRef>
+          <a:effectRef idx="1">
+            <a:schemeClr val="accent1"/>
+          </a:effectRef>
+          <a:fontRef idx="minor">
+            <a:schemeClr val="tx1"/>
+          </a:fontRef>
+        </p:style>
+      </p:cxnSp>
+      <p:cxnSp>
+        <p:nvCxnSpPr>
+          <p:cNvPr id="32" name="Straight Arrow Connector 31"/>
+          <p:cNvCxnSpPr/>
+          <p:nvPr/>
+        </p:nvCxnSpPr>
+        <p:spPr>
+          <a:xfrm>
+            <a:off x="5159048" y="4761827"/>
+            <a:ext cx="770742" cy="0"/>
+          </a:xfrm>
+          <a:prstGeom prst="straightConnector1">
+            <a:avLst/>
+          </a:prstGeom>
+          <a:ln>
+            <a:tailEnd type="arrow"/>
+          </a:ln>
+        </p:spPr>
+        <p:style>
+          <a:lnRef idx="2">
+            <a:schemeClr val="accent1"/>
+          </a:lnRef>
+          <a:fillRef idx="0">
+            <a:schemeClr val="accent1"/>
+          </a:fillRef>
+          <a:effectRef idx="1">
+            <a:schemeClr val="accent1"/>
+          </a:effectRef>
+          <a:fontRef idx="minor">
+            <a:schemeClr val="tx1"/>
+          </a:fontRef>
+        </p:style>
+      </p:cxnSp>
+      <p:cxnSp>
+        <p:nvCxnSpPr>
+          <p:cNvPr id="33" name="Straight Arrow Connector 32"/>
+          <p:cNvCxnSpPr>
+            <a:stCxn id="4" idx="5"/>
+            <a:endCxn id="27" idx="1"/>
+          </p:cNvCxnSpPr>
+          <p:nvPr/>
+        </p:nvCxnSpPr>
+        <p:spPr>
+          <a:xfrm>
+            <a:off x="1798647" y="3548363"/>
+            <a:ext cx="794515" cy="883339"/>
+          </a:xfrm>
+          <a:prstGeom prst="straightConnector1">
+            <a:avLst/>
+          </a:prstGeom>
+          <a:ln>
+            <a:tailEnd type="arrow"/>
+          </a:ln>
+        </p:spPr>
+        <p:style>
+          <a:lnRef idx="2">
+            <a:schemeClr val="accent1"/>
+          </a:lnRef>
+          <a:fillRef idx="0">
+            <a:schemeClr val="accent1"/>
+          </a:fillRef>
+          <a:effectRef idx="1">
+            <a:schemeClr val="accent1"/>
+          </a:effectRef>
+          <a:fontRef idx="minor">
+            <a:schemeClr val="tx1"/>
+          </a:fontRef>
+        </p:style>
+      </p:cxnSp>
+      <p:sp>
+        <p:nvSpPr>
+          <p:cNvPr id="39" name="TextBox 38"/>
           <p:cNvSpPr txBox="1"/>
           <p:nvPr/>
         </p:nvSpPr>
         <p:spPr>
           <a:xfrm>
-            <a:off x="2968535" y="2490558"/>
+            <a:off x="4437129" y="4496853"/>
             <a:ext cx="439173" cy="369332"/>
           </a:xfrm>
           <a:prstGeom prst="rect">
@@ -3394,13 +3765,10 @@
           </a:bodyPr>
           <a:lstStyle/>
           <a:p>
+            <a:pPr algn="ctr"/>
             <a:r>
               <a:rPr lang="en-US" dirty="0" smtClean="0"/>
-              <a:t>λ</a:t>
-            </a:r>
-            <a:r>
-              <a:rPr lang="en-US" baseline="-25000" dirty="0"/>
-              <a:t>1</a:t>
+              <a:t>…</a:t>
             </a:r>
             <a:endParaRPr lang="en-US" dirty="0"/>
           </a:p>
@@ -3408,14 +3776,14 @@
       </p:sp>
       <p:sp>
         <p:nvSpPr>
-          <p:cNvPr id="19" name="TextBox 18"/>
+          <p:cNvPr id="40" name="TextBox 39"/>
           <p:cNvSpPr txBox="1"/>
           <p:nvPr/>
         </p:nvSpPr>
         <p:spPr>
           <a:xfrm>
-            <a:off x="4834322" y="3720184"/>
-            <a:ext cx="439173" cy="369332"/>
+            <a:off x="3469343" y="1361047"/>
+            <a:ext cx="608852" cy="369332"/>
           </a:xfrm>
           <a:prstGeom prst="rect">
             <a:avLst/>
@@ -3434,7 +3802,11 @@
             </a:r>
             <a:r>
               <a:rPr lang="en-US" baseline="-25000" dirty="0" smtClean="0"/>
-              <a:t>3</a:t>
+              <a:t>2</a:t>
+            </a:r>
+            <a:r>
+              <a:rPr lang="en-US" baseline="30000" dirty="0" smtClean="0"/>
+              <a:t>(1)</a:t>
             </a:r>
             <a:endParaRPr lang="en-US" dirty="0"/>
           </a:p>
@@ -3442,14 +3814,14 @@
       </p:sp>
       <p:sp>
         <p:nvSpPr>
-          <p:cNvPr id="20" name="TextBox 19"/>
+          <p:cNvPr id="41" name="TextBox 40"/>
           <p:cNvSpPr txBox="1"/>
           <p:nvPr/>
         </p:nvSpPr>
         <p:spPr>
           <a:xfrm>
-            <a:off x="4834322" y="1669236"/>
-            <a:ext cx="439173" cy="369332"/>
+            <a:off x="5159048" y="1370054"/>
+            <a:ext cx="709339" cy="369332"/>
           </a:xfrm>
           <a:prstGeom prst="rect">
             <a:avLst/>
@@ -3468,7 +3840,209 @@
             </a:r>
             <a:r>
               <a:rPr lang="en-US" baseline="-25000" dirty="0" smtClean="0"/>
+              <a:t>L</a:t>
+            </a:r>
+            <a:r>
+              <a:rPr lang="en-US" baseline="-25000" dirty="0" smtClean="0"/>
+              <a:t>-1</a:t>
+            </a:r>
+            <a:r>
+              <a:rPr lang="en-US" baseline="30000" dirty="0" smtClean="0"/>
+              <a:t>(1)</a:t>
+            </a:r>
+            <a:endParaRPr lang="en-US" dirty="0"/>
+          </a:p>
+        </p:txBody>
+      </p:sp>
+      <p:sp>
+        <p:nvSpPr>
+          <p:cNvPr id="42" name="TextBox 41"/>
+          <p:cNvSpPr txBox="1"/>
+          <p:nvPr/>
+        </p:nvSpPr>
+        <p:spPr>
+          <a:xfrm>
+            <a:off x="7016213" y="2163023"/>
+            <a:ext cx="709339" cy="369332"/>
+          </a:xfrm>
+          <a:prstGeom prst="rect">
+            <a:avLst/>
+          </a:prstGeom>
+          <a:noFill/>
+        </p:spPr>
+        <p:txBody>
+          <a:bodyPr wrap="square" rtlCol="0">
+            <a:spAutoFit/>
+          </a:bodyPr>
+          <a:lstStyle/>
+          <a:p>
+            <a:r>
+              <a:rPr lang="en-US" dirty="0" smtClean="0"/>
+              <a:t>λ</a:t>
+            </a:r>
+            <a:r>
+              <a:rPr lang="en-US" baseline="-25000" dirty="0" smtClean="0"/>
+              <a:t>L</a:t>
+            </a:r>
+            <a:r>
+              <a:rPr lang="en-US" baseline="30000" dirty="0" smtClean="0"/>
+              <a:t>(1)</a:t>
+            </a:r>
+            <a:endParaRPr lang="en-US" dirty="0"/>
+          </a:p>
+        </p:txBody>
+      </p:sp>
+      <p:sp>
+        <p:nvSpPr>
+          <p:cNvPr id="43" name="TextBox 42"/>
+          <p:cNvSpPr txBox="1"/>
+          <p:nvPr/>
+        </p:nvSpPr>
+        <p:spPr>
+          <a:xfrm>
+            <a:off x="1798647" y="4050149"/>
+            <a:ext cx="608852" cy="369332"/>
+          </a:xfrm>
+          <a:prstGeom prst="rect">
+            <a:avLst/>
+          </a:prstGeom>
+          <a:noFill/>
+        </p:spPr>
+        <p:txBody>
+          <a:bodyPr wrap="square" rtlCol="0">
+            <a:spAutoFit/>
+          </a:bodyPr>
+          <a:lstStyle/>
+          <a:p>
+            <a:r>
+              <a:rPr lang="en-US" dirty="0" smtClean="0"/>
+              <a:t>λ</a:t>
+            </a:r>
+            <a:r>
+              <a:rPr lang="en-US" baseline="-25000" dirty="0" smtClean="0"/>
+              <a:t>1</a:t>
+            </a:r>
+            <a:r>
+              <a:rPr lang="en-US" baseline="30000" dirty="0" smtClean="0"/>
+              <a:t>(2)</a:t>
+            </a:r>
+            <a:endParaRPr lang="en-US" dirty="0"/>
+          </a:p>
+        </p:txBody>
+      </p:sp>
+      <p:sp>
+        <p:nvSpPr>
+          <p:cNvPr id="44" name="TextBox 43"/>
+          <p:cNvSpPr txBox="1"/>
+          <p:nvPr/>
+        </p:nvSpPr>
+        <p:spPr>
+          <a:xfrm>
+            <a:off x="3469343" y="4309776"/>
+            <a:ext cx="608852" cy="369332"/>
+          </a:xfrm>
+          <a:prstGeom prst="rect">
+            <a:avLst/>
+          </a:prstGeom>
+          <a:noFill/>
+        </p:spPr>
+        <p:txBody>
+          <a:bodyPr wrap="square" rtlCol="0">
+            <a:spAutoFit/>
+          </a:bodyPr>
+          <a:lstStyle/>
+          <a:p>
+            <a:r>
+              <a:rPr lang="en-US" dirty="0" smtClean="0"/>
+              <a:t>λ</a:t>
+            </a:r>
+            <a:r>
+              <a:rPr lang="en-US" baseline="-25000" dirty="0" smtClean="0"/>
               <a:t>2</a:t>
+            </a:r>
+            <a:r>
+              <a:rPr lang="en-US" baseline="30000" dirty="0" smtClean="0"/>
+              <a:t>(2)</a:t>
+            </a:r>
+            <a:endParaRPr lang="en-US" dirty="0"/>
+          </a:p>
+        </p:txBody>
+      </p:sp>
+      <p:sp>
+        <p:nvSpPr>
+          <p:cNvPr id="45" name="TextBox 44"/>
+          <p:cNvSpPr txBox="1"/>
+          <p:nvPr/>
+        </p:nvSpPr>
+        <p:spPr>
+          <a:xfrm>
+            <a:off x="5159048" y="4318783"/>
+            <a:ext cx="709339" cy="369332"/>
+          </a:xfrm>
+          <a:prstGeom prst="rect">
+            <a:avLst/>
+          </a:prstGeom>
+          <a:noFill/>
+        </p:spPr>
+        <p:txBody>
+          <a:bodyPr wrap="square" rtlCol="0">
+            <a:spAutoFit/>
+          </a:bodyPr>
+          <a:lstStyle/>
+          <a:p>
+            <a:r>
+              <a:rPr lang="en-US" dirty="0" smtClean="0"/>
+              <a:t>λ</a:t>
+            </a:r>
+            <a:r>
+              <a:rPr lang="en-US" baseline="-25000" dirty="0" smtClean="0"/>
+              <a:t>K</a:t>
+            </a:r>
+            <a:r>
+              <a:rPr lang="en-US" baseline="-25000" dirty="0" smtClean="0"/>
+              <a:t>-1</a:t>
+            </a:r>
+            <a:r>
+              <a:rPr lang="en-US" baseline="30000" dirty="0" smtClean="0"/>
+              <a:t>(2)</a:t>
+            </a:r>
+            <a:endParaRPr lang="en-US" dirty="0"/>
+          </a:p>
+        </p:txBody>
+      </p:sp>
+      <p:sp>
+        <p:nvSpPr>
+          <p:cNvPr id="46" name="TextBox 45"/>
+          <p:cNvSpPr txBox="1"/>
+          <p:nvPr/>
+        </p:nvSpPr>
+        <p:spPr>
+          <a:xfrm>
+            <a:off x="6984728" y="4050149"/>
+            <a:ext cx="608852" cy="369332"/>
+          </a:xfrm>
+          <a:prstGeom prst="rect">
+            <a:avLst/>
+          </a:prstGeom>
+          <a:noFill/>
+        </p:spPr>
+        <p:txBody>
+          <a:bodyPr wrap="square" rtlCol="0">
+            <a:spAutoFit/>
+          </a:bodyPr>
+          <a:lstStyle/>
+          <a:p>
+            <a:r>
+              <a:rPr lang="en-US" dirty="0" smtClean="0"/>
+              <a:t>λ</a:t>
+            </a:r>
+            <a:r>
+              <a:rPr lang="en-US" baseline="-25000" dirty="0" smtClean="0"/>
+              <a:t>K</a:t>
+            </a:r>
+            <a:r>
+              <a:rPr lang="en-US" baseline="30000" dirty="0" smtClean="0"/>
+              <a:t>(2)</a:t>
             </a:r>
             <a:endParaRPr lang="en-US" dirty="0"/>
           </a:p>
@@ -3477,7 +4051,7 @@
     </p:spTree>
     <p:extLst>
       <p:ext uri="{BB962C8B-B14F-4D97-AF65-F5344CB8AC3E}">
-        <p14:creationId xmlns:p14="http://schemas.microsoft.com/office/powerpoint/2010/main" val="2983908254"/>
+        <p14:creationId xmlns:p14="http://schemas.microsoft.com/office/powerpoint/2010/main" val="3171657820"/>
       </p:ext>
     </p:extLst>
   </p:cSld>
@@ -3504,166 +4078,291 @@
           <a:chExt cx="0" cy="0"/>
         </a:xfrm>
       </p:grpSpPr>
-      <p:pic>
-        <p:nvPicPr>
-          <p:cNvPr id="17" name="Picture 16" descr="Fig3_0.png"/>
-          <p:cNvPicPr>
-            <a:picLocks noChangeAspect="1"/>
-          </p:cNvPicPr>
+      <p:sp>
+        <p:nvSpPr>
+          <p:cNvPr id="4" name="Oval 3"/>
+          <p:cNvSpPr/>
           <p:nvPr/>
-        </p:nvPicPr>
-        <p:blipFill>
-          <a:blip r:embed="rId2">
-            <a:extLst>
-              <a:ext uri="{28A0092B-C50C-407E-A947-70E740481C1C}">
-                <a14:useLocalDpi xmlns:a14="http://schemas.microsoft.com/office/drawing/2010/main" val="0"/>
-              </a:ext>
-            </a:extLst>
-          </a:blip>
-          <a:stretch>
-            <a:fillRect/>
-          </a:stretch>
-        </p:blipFill>
-        <p:spPr>
-          <a:xfrm>
-            <a:off x="1662038" y="1038384"/>
-            <a:ext cx="1828800" cy="1219200"/>
-          </a:xfrm>
-          <a:prstGeom prst="rect">
-            <a:avLst/>
-          </a:prstGeom>
-        </p:spPr>
-      </p:pic>
-      <p:pic>
-        <p:nvPicPr>
-          <p:cNvPr id="18" name="Picture 17" descr="Fig3_1.png"/>
-          <p:cNvPicPr>
-            <a:picLocks noChangeAspect="1"/>
-          </p:cNvPicPr>
+        </p:nvSpPr>
+        <p:spPr>
+          <a:xfrm>
+            <a:off x="1270041" y="2314651"/>
+            <a:ext cx="1281911" cy="1281911"/>
+          </a:xfrm>
+          <a:prstGeom prst="ellipse">
+            <a:avLst/>
+          </a:prstGeom>
+        </p:spPr>
+        <p:style>
+          <a:lnRef idx="1">
+            <a:schemeClr val="accent1"/>
+          </a:lnRef>
+          <a:fillRef idx="3">
+            <a:schemeClr val="accent1"/>
+          </a:fillRef>
+          <a:effectRef idx="2">
+            <a:schemeClr val="accent1"/>
+          </a:effectRef>
+          <a:fontRef idx="minor">
+            <a:schemeClr val="lt1"/>
+          </a:fontRef>
+        </p:style>
+        <p:txBody>
+          <a:bodyPr rtlCol="0" anchor="ctr"/>
+          <a:lstStyle/>
+          <a:p>
+            <a:pPr algn="ctr"/>
+            <a:r>
+              <a:rPr lang="en-US" dirty="0"/>
+              <a:t>A</a:t>
+            </a:r>
+          </a:p>
+        </p:txBody>
+      </p:sp>
+      <p:sp>
+        <p:nvSpPr>
+          <p:cNvPr id="5" name="Oval 4"/>
+          <p:cNvSpPr/>
           <p:nvPr/>
-        </p:nvPicPr>
-        <p:blipFill>
-          <a:blip r:embed="rId3">
-            <a:extLst>
-              <a:ext uri="{28A0092B-C50C-407E-A947-70E740481C1C}">
-                <a14:useLocalDpi xmlns:a14="http://schemas.microsoft.com/office/drawing/2010/main" val="0"/>
-              </a:ext>
-            </a:extLst>
-          </a:blip>
-          <a:stretch>
-            <a:fillRect/>
-          </a:stretch>
-        </p:blipFill>
-        <p:spPr>
-          <a:xfrm>
-            <a:off x="3498830" y="1038384"/>
-            <a:ext cx="1828800" cy="1219200"/>
-          </a:xfrm>
-          <a:prstGeom prst="rect">
-            <a:avLst/>
-          </a:prstGeom>
-        </p:spPr>
-      </p:pic>
-      <p:pic>
-        <p:nvPicPr>
-          <p:cNvPr id="19" name="Picture 18" descr="Fig3_2.png"/>
-          <p:cNvPicPr>
-            <a:picLocks noChangeAspect="1"/>
-          </p:cNvPicPr>
+        </p:nvSpPr>
+        <p:spPr>
+          <a:xfrm>
+            <a:off x="3713263" y="2314651"/>
+            <a:ext cx="1281911" cy="1281911"/>
+          </a:xfrm>
+          <a:prstGeom prst="ellipse">
+            <a:avLst/>
+          </a:prstGeom>
+        </p:spPr>
+        <p:style>
+          <a:lnRef idx="1">
+            <a:schemeClr val="accent1"/>
+          </a:lnRef>
+          <a:fillRef idx="3">
+            <a:schemeClr val="accent1"/>
+          </a:fillRef>
+          <a:effectRef idx="2">
+            <a:schemeClr val="accent1"/>
+          </a:effectRef>
+          <a:fontRef idx="minor">
+            <a:schemeClr val="lt1"/>
+          </a:fontRef>
+        </p:style>
+        <p:txBody>
+          <a:bodyPr rtlCol="0" anchor="ctr"/>
+          <a:lstStyle/>
+          <a:p>
+            <a:pPr algn="ctr"/>
+            <a:r>
+              <a:rPr lang="en-US" dirty="0" smtClean="0"/>
+              <a:t>B</a:t>
+            </a:r>
+            <a:endParaRPr lang="en-US" dirty="0"/>
+          </a:p>
+        </p:txBody>
+      </p:sp>
+      <p:sp>
+        <p:nvSpPr>
+          <p:cNvPr id="6" name="Oval 5"/>
+          <p:cNvSpPr/>
           <p:nvPr/>
-        </p:nvPicPr>
-        <p:blipFill>
-          <a:blip r:embed="rId4">
-            <a:extLst>
-              <a:ext uri="{28A0092B-C50C-407E-A947-70E740481C1C}">
-                <a14:useLocalDpi xmlns:a14="http://schemas.microsoft.com/office/drawing/2010/main" val="0"/>
-              </a:ext>
-            </a:extLst>
-          </a:blip>
-          <a:stretch>
-            <a:fillRect/>
-          </a:stretch>
-        </p:blipFill>
-        <p:spPr>
-          <a:xfrm>
-            <a:off x="747638" y="2403369"/>
-            <a:ext cx="1828800" cy="1219200"/>
-          </a:xfrm>
-          <a:prstGeom prst="rect">
-            <a:avLst/>
-          </a:prstGeom>
-        </p:spPr>
-      </p:pic>
-      <p:pic>
-        <p:nvPicPr>
-          <p:cNvPr id="20" name="Picture 19" descr="Fig3_3.png"/>
-          <p:cNvPicPr>
-            <a:picLocks noChangeAspect="1"/>
-          </p:cNvPicPr>
+        </p:nvSpPr>
+        <p:spPr>
+          <a:xfrm>
+            <a:off x="5610208" y="571991"/>
+            <a:ext cx="1281911" cy="1281911"/>
+          </a:xfrm>
+          <a:prstGeom prst="ellipse">
+            <a:avLst/>
+          </a:prstGeom>
+        </p:spPr>
+        <p:style>
+          <a:lnRef idx="1">
+            <a:schemeClr val="accent1"/>
+          </a:lnRef>
+          <a:fillRef idx="3">
+            <a:schemeClr val="accent1"/>
+          </a:fillRef>
+          <a:effectRef idx="2">
+            <a:schemeClr val="accent1"/>
+          </a:effectRef>
+          <a:fontRef idx="minor">
+            <a:schemeClr val="lt1"/>
+          </a:fontRef>
+        </p:style>
+        <p:txBody>
+          <a:bodyPr rtlCol="0" anchor="ctr"/>
+          <a:lstStyle/>
+          <a:p>
+            <a:pPr algn="ctr"/>
+            <a:r>
+              <a:rPr lang="en-US" dirty="0" smtClean="0"/>
+              <a:t>C</a:t>
+            </a:r>
+            <a:endParaRPr lang="en-US" dirty="0"/>
+          </a:p>
+        </p:txBody>
+      </p:sp>
+      <p:sp>
+        <p:nvSpPr>
+          <p:cNvPr id="7" name="Oval 6"/>
+          <p:cNvSpPr/>
           <p:nvPr/>
-        </p:nvPicPr>
-        <p:blipFill>
-          <a:blip r:embed="rId5">
-            <a:extLst>
-              <a:ext uri="{28A0092B-C50C-407E-A947-70E740481C1C}">
-                <a14:useLocalDpi xmlns:a14="http://schemas.microsoft.com/office/drawing/2010/main" val="0"/>
-              </a:ext>
-            </a:extLst>
-          </a:blip>
-          <a:stretch>
-            <a:fillRect/>
-          </a:stretch>
-        </p:blipFill>
-        <p:spPr>
-          <a:xfrm>
-            <a:off x="2538454" y="2403369"/>
-            <a:ext cx="1828800" cy="1219200"/>
-          </a:xfrm>
-          <a:prstGeom prst="rect">
-            <a:avLst/>
-          </a:prstGeom>
-        </p:spPr>
-      </p:pic>
-      <p:pic>
-        <p:nvPicPr>
-          <p:cNvPr id="21" name="Picture 20" descr="Fig3_4.png"/>
-          <p:cNvPicPr>
-            <a:picLocks noChangeAspect="1"/>
-          </p:cNvPicPr>
+        </p:nvSpPr>
+        <p:spPr>
+          <a:xfrm>
+            <a:off x="5610208" y="4116907"/>
+            <a:ext cx="1281911" cy="1281911"/>
+          </a:xfrm>
+          <a:prstGeom prst="ellipse">
+            <a:avLst/>
+          </a:prstGeom>
+        </p:spPr>
+        <p:style>
+          <a:lnRef idx="1">
+            <a:schemeClr val="accent1"/>
+          </a:lnRef>
+          <a:fillRef idx="3">
+            <a:schemeClr val="accent1"/>
+          </a:fillRef>
+          <a:effectRef idx="2">
+            <a:schemeClr val="accent1"/>
+          </a:effectRef>
+          <a:fontRef idx="minor">
+            <a:schemeClr val="lt1"/>
+          </a:fontRef>
+        </p:style>
+        <p:txBody>
+          <a:bodyPr rtlCol="0" anchor="ctr"/>
+          <a:lstStyle/>
+          <a:p>
+            <a:pPr algn="ctr"/>
+            <a:r>
+              <a:rPr lang="en-US" dirty="0" smtClean="0"/>
+              <a:t>D</a:t>
+            </a:r>
+            <a:endParaRPr lang="en-US" dirty="0"/>
+          </a:p>
+        </p:txBody>
+      </p:sp>
+      <p:cxnSp>
+        <p:nvCxnSpPr>
+          <p:cNvPr id="9" name="Straight Arrow Connector 8"/>
+          <p:cNvCxnSpPr>
+            <a:stCxn id="4" idx="6"/>
+            <a:endCxn id="5" idx="2"/>
+          </p:cNvCxnSpPr>
           <p:nvPr/>
-        </p:nvPicPr>
-        <p:blipFill>
-          <a:blip r:embed="rId6">
-            <a:extLst>
-              <a:ext uri="{28A0092B-C50C-407E-A947-70E740481C1C}">
-                <a14:useLocalDpi xmlns:a14="http://schemas.microsoft.com/office/drawing/2010/main" val="0"/>
-              </a:ext>
-            </a:extLst>
-          </a:blip>
-          <a:stretch>
-            <a:fillRect/>
-          </a:stretch>
-        </p:blipFill>
-        <p:spPr>
-          <a:xfrm>
-            <a:off x="4321278" y="2392638"/>
-            <a:ext cx="1828800" cy="1219200"/>
-          </a:xfrm>
-          <a:prstGeom prst="rect">
-            <a:avLst/>
-          </a:prstGeom>
-        </p:spPr>
-      </p:pic>
-      <p:sp>
-        <p:nvSpPr>
-          <p:cNvPr id="10" name="TextBox 9"/>
+        </p:nvCxnSpPr>
+        <p:spPr>
+          <a:xfrm>
+            <a:off x="2551952" y="2955607"/>
+            <a:ext cx="1161311" cy="0"/>
+          </a:xfrm>
+          <a:prstGeom prst="straightConnector1">
+            <a:avLst/>
+          </a:prstGeom>
+          <a:ln>
+            <a:tailEnd type="arrow"/>
+          </a:ln>
+        </p:spPr>
+        <p:style>
+          <a:lnRef idx="2">
+            <a:schemeClr val="accent1"/>
+          </a:lnRef>
+          <a:fillRef idx="0">
+            <a:schemeClr val="accent1"/>
+          </a:fillRef>
+          <a:effectRef idx="1">
+            <a:schemeClr val="accent1"/>
+          </a:effectRef>
+          <a:fontRef idx="minor">
+            <a:schemeClr val="tx1"/>
+          </a:fontRef>
+        </p:style>
+      </p:cxnSp>
+      <p:cxnSp>
+        <p:nvCxnSpPr>
+          <p:cNvPr id="12" name="Straight Arrow Connector 11"/>
+          <p:cNvCxnSpPr>
+            <a:stCxn id="5" idx="7"/>
+            <a:endCxn id="6" idx="3"/>
+          </p:cNvCxnSpPr>
+          <p:nvPr/>
+        </p:nvCxnSpPr>
+        <p:spPr>
+          <a:xfrm flipV="1">
+            <a:off x="4807442" y="1666170"/>
+            <a:ext cx="990498" cy="836213"/>
+          </a:xfrm>
+          <a:prstGeom prst="straightConnector1">
+            <a:avLst/>
+          </a:prstGeom>
+          <a:ln>
+            <a:tailEnd type="arrow"/>
+          </a:ln>
+        </p:spPr>
+        <p:style>
+          <a:lnRef idx="2">
+            <a:schemeClr val="accent1"/>
+          </a:lnRef>
+          <a:fillRef idx="0">
+            <a:schemeClr val="accent1"/>
+          </a:fillRef>
+          <a:effectRef idx="1">
+            <a:schemeClr val="accent1"/>
+          </a:effectRef>
+          <a:fontRef idx="minor">
+            <a:schemeClr val="tx1"/>
+          </a:fontRef>
+        </p:style>
+      </p:cxnSp>
+      <p:cxnSp>
+        <p:nvCxnSpPr>
+          <p:cNvPr id="14" name="Straight Arrow Connector 13"/>
+          <p:cNvCxnSpPr>
+            <a:stCxn id="5" idx="5"/>
+            <a:endCxn id="7" idx="1"/>
+          </p:cNvCxnSpPr>
+          <p:nvPr/>
+        </p:nvCxnSpPr>
+        <p:spPr>
+          <a:xfrm>
+            <a:off x="4807442" y="3408830"/>
+            <a:ext cx="990498" cy="895809"/>
+          </a:xfrm>
+          <a:prstGeom prst="straightConnector1">
+            <a:avLst/>
+          </a:prstGeom>
+          <a:ln>
+            <a:tailEnd type="arrow"/>
+          </a:ln>
+        </p:spPr>
+        <p:style>
+          <a:lnRef idx="2">
+            <a:schemeClr val="accent1"/>
+          </a:lnRef>
+          <a:fillRef idx="0">
+            <a:schemeClr val="accent1"/>
+          </a:fillRef>
+          <a:effectRef idx="1">
+            <a:schemeClr val="accent1"/>
+          </a:effectRef>
+          <a:fontRef idx="minor">
+            <a:schemeClr val="tx1"/>
+          </a:fontRef>
+        </p:style>
+      </p:cxnSp>
+      <p:sp>
+        <p:nvSpPr>
+          <p:cNvPr id="18" name="TextBox 17"/>
           <p:cNvSpPr txBox="1"/>
           <p:nvPr/>
         </p:nvSpPr>
         <p:spPr>
           <a:xfrm>
-            <a:off x="2099053" y="892183"/>
-            <a:ext cx="955069" cy="276999"/>
+            <a:off x="2968535" y="2490558"/>
+            <a:ext cx="439173" cy="369332"/>
           </a:xfrm>
           <a:prstGeom prst="rect">
             <a:avLst/>
@@ -3676,29 +4375,28 @@
           </a:bodyPr>
           <a:lstStyle/>
           <a:p>
-            <a:pPr algn="ctr"/>
-            <a:r>
-              <a:rPr lang="en-US" sz="1200" dirty="0"/>
-              <a:t>t</a:t>
-            </a:r>
-            <a:r>
-              <a:rPr lang="en-US" sz="1200" dirty="0" smtClean="0"/>
-              <a:t>ime 0</a:t>
-            </a:r>
-            <a:endParaRPr lang="en-US" sz="1200" dirty="0"/>
-          </a:p>
-        </p:txBody>
-      </p:sp>
-      <p:sp>
-        <p:nvSpPr>
-          <p:cNvPr id="11" name="TextBox 10"/>
+            <a:r>
+              <a:rPr lang="en-US" dirty="0" smtClean="0"/>
+              <a:t>λ</a:t>
+            </a:r>
+            <a:r>
+              <a:rPr lang="en-US" baseline="-25000" dirty="0"/>
+              <a:t>1</a:t>
+            </a:r>
+            <a:endParaRPr lang="en-US" dirty="0"/>
+          </a:p>
+        </p:txBody>
+      </p:sp>
+      <p:sp>
+        <p:nvSpPr>
+          <p:cNvPr id="19" name="TextBox 18"/>
           <p:cNvSpPr txBox="1"/>
           <p:nvPr/>
         </p:nvSpPr>
         <p:spPr>
           <a:xfrm>
-            <a:off x="3938198" y="892183"/>
-            <a:ext cx="955069" cy="276999"/>
+            <a:off x="4834322" y="3720184"/>
+            <a:ext cx="439173" cy="369332"/>
           </a:xfrm>
           <a:prstGeom prst="rect">
             <a:avLst/>
@@ -3711,29 +4409,28 @@
           </a:bodyPr>
           <a:lstStyle/>
           <a:p>
-            <a:pPr algn="ctr"/>
-            <a:r>
-              <a:rPr lang="en-US" sz="1200" dirty="0"/>
-              <a:t>t</a:t>
-            </a:r>
-            <a:r>
-              <a:rPr lang="en-US" sz="1200" dirty="0" smtClean="0"/>
-              <a:t>ime 1</a:t>
-            </a:r>
-            <a:endParaRPr lang="en-US" sz="1200" dirty="0"/>
-          </a:p>
-        </p:txBody>
-      </p:sp>
-      <p:sp>
-        <p:nvSpPr>
-          <p:cNvPr id="12" name="TextBox 11"/>
+            <a:r>
+              <a:rPr lang="en-US" dirty="0" smtClean="0"/>
+              <a:t>λ</a:t>
+            </a:r>
+            <a:r>
+              <a:rPr lang="en-US" baseline="-25000" dirty="0" smtClean="0"/>
+              <a:t>3</a:t>
+            </a:r>
+            <a:endParaRPr lang="en-US" dirty="0"/>
+          </a:p>
+        </p:txBody>
+      </p:sp>
+      <p:sp>
+        <p:nvSpPr>
+          <p:cNvPr id="20" name="TextBox 19"/>
           <p:cNvSpPr txBox="1"/>
           <p:nvPr/>
         </p:nvSpPr>
         <p:spPr>
           <a:xfrm>
-            <a:off x="1184503" y="2245192"/>
-            <a:ext cx="955069" cy="276999"/>
+            <a:off x="4834322" y="1669236"/>
+            <a:ext cx="439173" cy="369332"/>
           </a:xfrm>
           <a:prstGeom prst="rect">
             <a:avLst/>
@@ -3746,89 +4443,22 @@
           </a:bodyPr>
           <a:lstStyle/>
           <a:p>
-            <a:pPr algn="ctr"/>
-            <a:r>
-              <a:rPr lang="en-US" sz="1200" dirty="0"/>
-              <a:t>t</a:t>
-            </a:r>
-            <a:r>
-              <a:rPr lang="en-US" sz="1200" dirty="0" smtClean="0"/>
-              <a:t>ime 2</a:t>
-            </a:r>
-            <a:endParaRPr lang="en-US" sz="1200" dirty="0"/>
-          </a:p>
-        </p:txBody>
-      </p:sp>
-      <p:sp>
-        <p:nvSpPr>
-          <p:cNvPr id="13" name="TextBox 12"/>
-          <p:cNvSpPr txBox="1"/>
-          <p:nvPr/>
-        </p:nvSpPr>
-        <p:spPr>
-          <a:xfrm>
-            <a:off x="2975842" y="2245192"/>
-            <a:ext cx="955069" cy="276999"/>
-          </a:xfrm>
-          <a:prstGeom prst="rect">
-            <a:avLst/>
-          </a:prstGeom>
-          <a:noFill/>
-        </p:spPr>
-        <p:txBody>
-          <a:bodyPr wrap="square" rtlCol="0">
-            <a:spAutoFit/>
-          </a:bodyPr>
-          <a:lstStyle/>
-          <a:p>
-            <a:pPr algn="ctr"/>
-            <a:r>
-              <a:rPr lang="en-US" sz="1200" dirty="0"/>
-              <a:t>t</a:t>
-            </a:r>
-            <a:r>
-              <a:rPr lang="en-US" sz="1200" dirty="0" smtClean="0"/>
-              <a:t>ime 3</a:t>
-            </a:r>
-            <a:endParaRPr lang="en-US" sz="1200" dirty="0"/>
-          </a:p>
-        </p:txBody>
-      </p:sp>
-      <p:sp>
-        <p:nvSpPr>
-          <p:cNvPr id="14" name="TextBox 13"/>
-          <p:cNvSpPr txBox="1"/>
-          <p:nvPr/>
-        </p:nvSpPr>
-        <p:spPr>
-          <a:xfrm>
-            <a:off x="4756832" y="2245192"/>
-            <a:ext cx="955069" cy="276999"/>
-          </a:xfrm>
-          <a:prstGeom prst="rect">
-            <a:avLst/>
-          </a:prstGeom>
-          <a:noFill/>
-        </p:spPr>
-        <p:txBody>
-          <a:bodyPr wrap="square" rtlCol="0">
-            <a:spAutoFit/>
-          </a:bodyPr>
-          <a:lstStyle/>
-          <a:p>
-            <a:pPr algn="ctr"/>
-            <a:r>
-              <a:rPr lang="en-US" sz="1200" dirty="0" smtClean="0"/>
-              <a:t>time 4</a:t>
-            </a:r>
-            <a:endParaRPr lang="en-US" sz="1200" dirty="0"/>
+            <a:r>
+              <a:rPr lang="en-US" dirty="0" smtClean="0"/>
+              <a:t>λ</a:t>
+            </a:r>
+            <a:r>
+              <a:rPr lang="en-US" baseline="-25000" dirty="0" smtClean="0"/>
+              <a:t>2</a:t>
+            </a:r>
+            <a:endParaRPr lang="en-US" dirty="0"/>
           </a:p>
         </p:txBody>
       </p:sp>
     </p:spTree>
     <p:extLst>
       <p:ext uri="{BB962C8B-B14F-4D97-AF65-F5344CB8AC3E}">
-        <p14:creationId xmlns:p14="http://schemas.microsoft.com/office/powerpoint/2010/main" val="3623798092"/>
+        <p14:creationId xmlns:p14="http://schemas.microsoft.com/office/powerpoint/2010/main" val="2983908254"/>
       </p:ext>
     </p:extLst>
   </p:cSld>
@@ -3857,7 +4487,7 @@
       </p:grpSpPr>
       <p:pic>
         <p:nvPicPr>
-          <p:cNvPr id="17" name="Picture 16" descr="Fig4_0.png"/>
+          <p:cNvPr id="2" name="Picture 1" descr="Fig3_0.png"/>
           <p:cNvPicPr>
             <a:picLocks noChangeAspect="1"/>
           </p:cNvPicPr>
@@ -3877,7 +4507,7 @@
         </p:blipFill>
         <p:spPr>
           <a:xfrm>
-            <a:off x="1662038" y="1038384"/>
+            <a:off x="1693494" y="1046984"/>
             <a:ext cx="1828800" cy="1219200"/>
           </a:xfrm>
           <a:prstGeom prst="rect">
@@ -3887,7 +4517,7 @@
       </p:pic>
       <p:pic>
         <p:nvPicPr>
-          <p:cNvPr id="18" name="Picture 17" descr="Fig4_1.png"/>
+          <p:cNvPr id="3" name="Picture 2" descr="Fig3_1.png"/>
           <p:cNvPicPr>
             <a:picLocks noChangeAspect="1"/>
           </p:cNvPicPr>
@@ -3907,7 +4537,7 @@
         </p:blipFill>
         <p:spPr>
           <a:xfrm>
-            <a:off x="3498830" y="1038384"/>
+            <a:off x="3490838" y="1046984"/>
             <a:ext cx="1828800" cy="1219200"/>
           </a:xfrm>
           <a:prstGeom prst="rect">
@@ -3917,7 +4547,7 @@
       </p:pic>
       <p:pic>
         <p:nvPicPr>
-          <p:cNvPr id="19" name="Picture 18" descr="Fig4_2.png"/>
+          <p:cNvPr id="4" name="Picture 3" descr="Fig3_2.png"/>
           <p:cNvPicPr>
             <a:picLocks noChangeAspect="1"/>
           </p:cNvPicPr>
@@ -3937,7 +4567,7 @@
         </p:blipFill>
         <p:spPr>
           <a:xfrm>
-            <a:off x="755630" y="2403369"/>
+            <a:off x="747638" y="2403369"/>
             <a:ext cx="1828800" cy="1219200"/>
           </a:xfrm>
           <a:prstGeom prst="rect">
@@ -3947,7 +4577,7 @@
       </p:pic>
       <p:pic>
         <p:nvPicPr>
-          <p:cNvPr id="20" name="Picture 19" descr="Fig4_3.png"/>
+          <p:cNvPr id="5" name="Picture 4" descr="Fig3_3.png"/>
           <p:cNvPicPr>
             <a:picLocks noChangeAspect="1"/>
           </p:cNvPicPr>
@@ -3967,7 +4597,7 @@
         </p:blipFill>
         <p:spPr>
           <a:xfrm>
-            <a:off x="2538454" y="2403369"/>
+            <a:off x="2534458" y="2392638"/>
             <a:ext cx="1828800" cy="1219200"/>
           </a:xfrm>
           <a:prstGeom prst="rect">
@@ -3977,7 +4607,7 @@
       </p:pic>
       <p:pic>
         <p:nvPicPr>
-          <p:cNvPr id="21" name="Picture 20" descr="Fig4_4.png"/>
+          <p:cNvPr id="6" name="Picture 5" descr="Fig3_4.png"/>
           <p:cNvPicPr>
             <a:picLocks noChangeAspect="1"/>
           </p:cNvPicPr>
@@ -3997,7 +4627,7 @@
         </p:blipFill>
         <p:spPr>
           <a:xfrm>
-            <a:off x="4321278" y="2403369"/>
+            <a:off x="4321278" y="2392638"/>
             <a:ext cx="1828800" cy="1219200"/>
           </a:xfrm>
           <a:prstGeom prst="rect">
@@ -4013,7 +4643,7 @@
         </p:nvSpPr>
         <p:spPr>
           <a:xfrm>
-            <a:off x="2099053" y="892183"/>
+            <a:off x="2120043" y="892183"/>
             <a:ext cx="955069" cy="276999"/>
           </a:xfrm>
           <a:prstGeom prst="rect">
@@ -4179,7 +4809,358 @@
     </p:spTree>
     <p:extLst>
       <p:ext uri="{BB962C8B-B14F-4D97-AF65-F5344CB8AC3E}">
-        <p14:creationId xmlns:p14="http://schemas.microsoft.com/office/powerpoint/2010/main" val="812380465"/>
+        <p14:creationId xmlns:p14="http://schemas.microsoft.com/office/powerpoint/2010/main" val="3623798092"/>
+      </p:ext>
+    </p:extLst>
+  </p:cSld>
+  <p:clrMapOvr>
+    <a:masterClrMapping/>
+  </p:clrMapOvr>
+</p:sld>
+</file>
+
+<file path=ppt/slides/slide4.xml><?xml version="1.0" encoding="utf-8"?>
+<p:sld xmlns:a="http://schemas.openxmlformats.org/drawingml/2006/main" xmlns:r="http://schemas.openxmlformats.org/officeDocument/2006/relationships" xmlns:p="http://schemas.openxmlformats.org/presentationml/2006/main">
+  <p:cSld>
+    <p:spTree>
+      <p:nvGrpSpPr>
+        <p:cNvPr id="1" name=""/>
+        <p:cNvGrpSpPr/>
+        <p:nvPr/>
+      </p:nvGrpSpPr>
+      <p:grpSpPr>
+        <a:xfrm>
+          <a:off x="0" y="0"/>
+          <a:ext cx="0" cy="0"/>
+          <a:chOff x="0" y="0"/>
+          <a:chExt cx="0" cy="0"/>
+        </a:xfrm>
+      </p:grpSpPr>
+      <p:pic>
+        <p:nvPicPr>
+          <p:cNvPr id="7" name="Picture 6" descr="Fig4_0.png"/>
+          <p:cNvPicPr>
+            <a:picLocks noChangeAspect="1"/>
+          </p:cNvPicPr>
+          <p:nvPr/>
+        </p:nvPicPr>
+        <p:blipFill>
+          <a:blip r:embed="rId2">
+            <a:extLst>
+              <a:ext uri="{28A0092B-C50C-407E-A947-70E740481C1C}">
+                <a14:useLocalDpi xmlns:a14="http://schemas.microsoft.com/office/drawing/2010/main" val="0"/>
+              </a:ext>
+            </a:extLst>
+          </a:blip>
+          <a:stretch>
+            <a:fillRect/>
+          </a:stretch>
+        </p:blipFill>
+        <p:spPr>
+          <a:xfrm>
+            <a:off x="1693494" y="1064278"/>
+            <a:ext cx="1828800" cy="1219200"/>
+          </a:xfrm>
+          <a:prstGeom prst="rect">
+            <a:avLst/>
+          </a:prstGeom>
+        </p:spPr>
+      </p:pic>
+      <p:pic>
+        <p:nvPicPr>
+          <p:cNvPr id="8" name="Picture 7" descr="Fig4_1.png"/>
+          <p:cNvPicPr>
+            <a:picLocks noChangeAspect="1"/>
+          </p:cNvPicPr>
+          <p:nvPr/>
+        </p:nvPicPr>
+        <p:blipFill>
+          <a:blip r:embed="rId3">
+            <a:extLst>
+              <a:ext uri="{28A0092B-C50C-407E-A947-70E740481C1C}">
+                <a14:useLocalDpi xmlns:a14="http://schemas.microsoft.com/office/drawing/2010/main" val="0"/>
+              </a:ext>
+            </a:extLst>
+          </a:blip>
+          <a:stretch>
+            <a:fillRect/>
+          </a:stretch>
+        </p:blipFill>
+        <p:spPr>
+          <a:xfrm>
+            <a:off x="3463828" y="1064278"/>
+            <a:ext cx="1828800" cy="1219200"/>
+          </a:xfrm>
+          <a:prstGeom prst="rect">
+            <a:avLst/>
+          </a:prstGeom>
+        </p:spPr>
+      </p:pic>
+      <p:pic>
+        <p:nvPicPr>
+          <p:cNvPr id="9" name="Picture 8" descr="Fig4_2.png"/>
+          <p:cNvPicPr>
+            <a:picLocks noChangeAspect="1"/>
+          </p:cNvPicPr>
+          <p:nvPr/>
+        </p:nvPicPr>
+        <p:blipFill>
+          <a:blip r:embed="rId4">
+            <a:extLst>
+              <a:ext uri="{28A0092B-C50C-407E-A947-70E740481C1C}">
+                <a14:useLocalDpi xmlns:a14="http://schemas.microsoft.com/office/drawing/2010/main" val="0"/>
+              </a:ext>
+            </a:extLst>
+          </a:blip>
+          <a:stretch>
+            <a:fillRect/>
+          </a:stretch>
+        </p:blipFill>
+        <p:spPr>
+          <a:xfrm>
+            <a:off x="747638" y="2403369"/>
+            <a:ext cx="1828800" cy="1219200"/>
+          </a:xfrm>
+          <a:prstGeom prst="rect">
+            <a:avLst/>
+          </a:prstGeom>
+        </p:spPr>
+      </p:pic>
+      <p:pic>
+        <p:nvPicPr>
+          <p:cNvPr id="15" name="Picture 14" descr="Fig4_3.png"/>
+          <p:cNvPicPr>
+            <a:picLocks noChangeAspect="1"/>
+          </p:cNvPicPr>
+          <p:nvPr/>
+        </p:nvPicPr>
+        <p:blipFill>
+          <a:blip r:embed="rId5">
+            <a:extLst>
+              <a:ext uri="{28A0092B-C50C-407E-A947-70E740481C1C}">
+                <a14:useLocalDpi xmlns:a14="http://schemas.microsoft.com/office/drawing/2010/main" val="0"/>
+              </a:ext>
+            </a:extLst>
+          </a:blip>
+          <a:stretch>
+            <a:fillRect/>
+          </a:stretch>
+        </p:blipFill>
+        <p:spPr>
+          <a:xfrm>
+            <a:off x="2534458" y="2403369"/>
+            <a:ext cx="1828800" cy="1219200"/>
+          </a:xfrm>
+          <a:prstGeom prst="rect">
+            <a:avLst/>
+          </a:prstGeom>
+        </p:spPr>
+      </p:pic>
+      <p:pic>
+        <p:nvPicPr>
+          <p:cNvPr id="16" name="Picture 15" descr="Fig4_4.png"/>
+          <p:cNvPicPr>
+            <a:picLocks noChangeAspect="1"/>
+          </p:cNvPicPr>
+          <p:nvPr/>
+        </p:nvPicPr>
+        <p:blipFill>
+          <a:blip r:embed="rId6">
+            <a:extLst>
+              <a:ext uri="{28A0092B-C50C-407E-A947-70E740481C1C}">
+                <a14:useLocalDpi xmlns:a14="http://schemas.microsoft.com/office/drawing/2010/main" val="0"/>
+              </a:ext>
+            </a:extLst>
+          </a:blip>
+          <a:stretch>
+            <a:fillRect/>
+          </a:stretch>
+        </p:blipFill>
+        <p:spPr>
+          <a:xfrm>
+            <a:off x="4321278" y="2392638"/>
+            <a:ext cx="1828800" cy="1219200"/>
+          </a:xfrm>
+          <a:prstGeom prst="rect">
+            <a:avLst/>
+          </a:prstGeom>
+        </p:spPr>
+      </p:pic>
+      <p:sp>
+        <p:nvSpPr>
+          <p:cNvPr id="10" name="TextBox 9"/>
+          <p:cNvSpPr txBox="1"/>
+          <p:nvPr/>
+        </p:nvSpPr>
+        <p:spPr>
+          <a:xfrm>
+            <a:off x="2120043" y="892183"/>
+            <a:ext cx="955069" cy="276999"/>
+          </a:xfrm>
+          <a:prstGeom prst="rect">
+            <a:avLst/>
+          </a:prstGeom>
+          <a:noFill/>
+        </p:spPr>
+        <p:txBody>
+          <a:bodyPr wrap="square" rtlCol="0">
+            <a:spAutoFit/>
+          </a:bodyPr>
+          <a:lstStyle/>
+          <a:p>
+            <a:pPr algn="ctr"/>
+            <a:r>
+              <a:rPr lang="en-US" sz="1200" dirty="0"/>
+              <a:t>t</a:t>
+            </a:r>
+            <a:r>
+              <a:rPr lang="en-US" sz="1200" dirty="0" smtClean="0"/>
+              <a:t>ime 0</a:t>
+            </a:r>
+            <a:endParaRPr lang="en-US" sz="1200" dirty="0"/>
+          </a:p>
+        </p:txBody>
+      </p:sp>
+      <p:sp>
+        <p:nvSpPr>
+          <p:cNvPr id="11" name="TextBox 10"/>
+          <p:cNvSpPr txBox="1"/>
+          <p:nvPr/>
+        </p:nvSpPr>
+        <p:spPr>
+          <a:xfrm>
+            <a:off x="3938198" y="892183"/>
+            <a:ext cx="955069" cy="276999"/>
+          </a:xfrm>
+          <a:prstGeom prst="rect">
+            <a:avLst/>
+          </a:prstGeom>
+          <a:noFill/>
+        </p:spPr>
+        <p:txBody>
+          <a:bodyPr wrap="square" rtlCol="0">
+            <a:spAutoFit/>
+          </a:bodyPr>
+          <a:lstStyle/>
+          <a:p>
+            <a:pPr algn="ctr"/>
+            <a:r>
+              <a:rPr lang="en-US" sz="1200" dirty="0"/>
+              <a:t>t</a:t>
+            </a:r>
+            <a:r>
+              <a:rPr lang="en-US" sz="1200" dirty="0" smtClean="0"/>
+              <a:t>ime 1</a:t>
+            </a:r>
+            <a:endParaRPr lang="en-US" sz="1200" dirty="0"/>
+          </a:p>
+        </p:txBody>
+      </p:sp>
+      <p:sp>
+        <p:nvSpPr>
+          <p:cNvPr id="12" name="TextBox 11"/>
+          <p:cNvSpPr txBox="1"/>
+          <p:nvPr/>
+        </p:nvSpPr>
+        <p:spPr>
+          <a:xfrm>
+            <a:off x="1184503" y="2245192"/>
+            <a:ext cx="955069" cy="276999"/>
+          </a:xfrm>
+          <a:prstGeom prst="rect">
+            <a:avLst/>
+          </a:prstGeom>
+          <a:noFill/>
+        </p:spPr>
+        <p:txBody>
+          <a:bodyPr wrap="square" rtlCol="0">
+            <a:spAutoFit/>
+          </a:bodyPr>
+          <a:lstStyle/>
+          <a:p>
+            <a:pPr algn="ctr"/>
+            <a:r>
+              <a:rPr lang="en-US" sz="1200" dirty="0"/>
+              <a:t>t</a:t>
+            </a:r>
+            <a:r>
+              <a:rPr lang="en-US" sz="1200" dirty="0" smtClean="0"/>
+              <a:t>ime 2</a:t>
+            </a:r>
+            <a:endParaRPr lang="en-US" sz="1200" dirty="0"/>
+          </a:p>
+        </p:txBody>
+      </p:sp>
+      <p:sp>
+        <p:nvSpPr>
+          <p:cNvPr id="13" name="TextBox 12"/>
+          <p:cNvSpPr txBox="1"/>
+          <p:nvPr/>
+        </p:nvSpPr>
+        <p:spPr>
+          <a:xfrm>
+            <a:off x="2975842" y="2245192"/>
+            <a:ext cx="955069" cy="276999"/>
+          </a:xfrm>
+          <a:prstGeom prst="rect">
+            <a:avLst/>
+          </a:prstGeom>
+          <a:noFill/>
+        </p:spPr>
+        <p:txBody>
+          <a:bodyPr wrap="square" rtlCol="0">
+            <a:spAutoFit/>
+          </a:bodyPr>
+          <a:lstStyle/>
+          <a:p>
+            <a:pPr algn="ctr"/>
+            <a:r>
+              <a:rPr lang="en-US" sz="1200" dirty="0"/>
+              <a:t>t</a:t>
+            </a:r>
+            <a:r>
+              <a:rPr lang="en-US" sz="1200" dirty="0" smtClean="0"/>
+              <a:t>ime 3</a:t>
+            </a:r>
+            <a:endParaRPr lang="en-US" sz="1200" dirty="0"/>
+          </a:p>
+        </p:txBody>
+      </p:sp>
+      <p:sp>
+        <p:nvSpPr>
+          <p:cNvPr id="14" name="TextBox 13"/>
+          <p:cNvSpPr txBox="1"/>
+          <p:nvPr/>
+        </p:nvSpPr>
+        <p:spPr>
+          <a:xfrm>
+            <a:off x="4756832" y="2245192"/>
+            <a:ext cx="955069" cy="276999"/>
+          </a:xfrm>
+          <a:prstGeom prst="rect">
+            <a:avLst/>
+          </a:prstGeom>
+          <a:noFill/>
+        </p:spPr>
+        <p:txBody>
+          <a:bodyPr wrap="square" rtlCol="0">
+            <a:spAutoFit/>
+          </a:bodyPr>
+          <a:lstStyle/>
+          <a:p>
+            <a:pPr algn="ctr"/>
+            <a:r>
+              <a:rPr lang="en-US" sz="1200" dirty="0" smtClean="0"/>
+              <a:t>time 4</a:t>
+            </a:r>
+            <a:endParaRPr lang="en-US" sz="1200" dirty="0"/>
+          </a:p>
+        </p:txBody>
+      </p:sp>
+    </p:spTree>
+    <p:extLst>
+      <p:ext uri="{BB962C8B-B14F-4D97-AF65-F5344CB8AC3E}">
+        <p14:creationId xmlns:p14="http://schemas.microsoft.com/office/powerpoint/2010/main" val="4262791711"/>
       </p:ext>
     </p:extLst>
   </p:cSld>

</xml_diff>